<commit_message>
updated harp projects chart
</commit_message>
<xml_diff>
--- a/HARP-Onboarding/HARP_Timeline.pptx
+++ b/HARP-Onboarding/HARP_Timeline.pptx
@@ -5,7 +5,7 @@
     <p:sldMasterId id="2147483696" r:id="rId1"/>
   </p:sldMasterIdLst>
   <p:sldIdLst>
-    <p:sldId id="268" r:id="rId2"/>
+    <p:sldId id="269" r:id="rId2"/>
   </p:sldIdLst>
   <p:sldSz cx="12192000" cy="13716000"/>
   <p:notesSz cx="6858000" cy="9144000"/>
@@ -215,7 +215,7 @@
           <c:yMode val="edge"/>
           <c:x val="0.43397274921166973"/>
           <c:y val="8.4267146585140576E-2"/>
-          <c:w val="0.53076664607984236"/>
+          <c:w val="0.55394890983887635"/>
           <c:h val="0.87387863170965119"/>
         </c:manualLayout>
       </c:layout>
@@ -247,9 +247,9 @@
           <c:invertIfNegative val="0"/>
           <c:cat>
             <c:strRef>
-              <c:f>Sheet1!$B$2:$B$24</c:f>
+              <c:f>Sheet1!$B$2:$B$25</c:f>
               <c:strCache>
-                <c:ptCount val="23"/>
+                <c:ptCount val="24"/>
                 <c:pt idx="0">
                   <c:v>HARP Conception</c:v>
                 </c:pt>
@@ -308,12 +308,15 @@
                   <c:v>Model Period Synthesis (Drought Forecasting)</c:v>
                 </c:pt>
                 <c:pt idx="19">
-                  <c:v>Water Supply Operations Model - Python (Tentative)</c:v>
-                </c:pt>
-                <c:pt idx="21">
+                  <c:v>VAHydro Model 3.0 (HSP2) - Operational Model in Python </c:v>
+                </c:pt>
+                <c:pt idx="20">
+                  <c:v>Water Supply Planning Tools for Local Governments</c:v>
+                </c:pt>
+                <c:pt idx="22">
                   <c:v>WUDR (Consumptive Use Data Transfer, Export, and Analysis)</c:v>
                 </c:pt>
-                <c:pt idx="22">
+                <c:pt idx="23">
                   <c:v>WUDR (Quantifying Unreported Water Use for Crop Irrigation)  </c:v>
                 </c:pt>
               </c:strCache>
@@ -321,10 +324,10 @@
           </c:cat>
           <c:val>
             <c:numRef>
-              <c:f>Sheet1!$C$2:$C$24</c:f>
+              <c:f>Sheet1!$C$2:$C$25</c:f>
               <c:numCache>
                 <c:formatCode>m/d/yy;@</c:formatCode>
-                <c:ptCount val="23"/>
+                <c:ptCount val="24"/>
                 <c:pt idx="0">
                   <c:v>41275</c:v>
                 </c:pt>
@@ -385,10 +388,13 @@
                 <c:pt idx="19">
                   <c:v>44718</c:v>
                 </c:pt>
-                <c:pt idx="21">
+                <c:pt idx="20">
+                  <c:v>45061</c:v>
+                </c:pt>
+                <c:pt idx="22">
                   <c:v>42948</c:v>
                 </c:pt>
-                <c:pt idx="22">
+                <c:pt idx="23">
                   <c:v>44075</c:v>
                 </c:pt>
               </c:numCache>
@@ -577,28 +583,6 @@
             </c:extLst>
           </c:dPt>
           <c:dPt>
-            <c:idx val="21"/>
-            <c:invertIfNegative val="0"/>
-            <c:bubble3D val="0"/>
-            <c:spPr>
-              <a:solidFill>
-                <a:schemeClr val="accent2">
-                  <a:lumMod val="40000"/>
-                  <a:lumOff val="60000"/>
-                </a:schemeClr>
-              </a:solidFill>
-              <a:ln>
-                <a:noFill/>
-              </a:ln>
-              <a:effectLst/>
-            </c:spPr>
-            <c:extLst>
-              <c:ext xmlns:c16="http://schemas.microsoft.com/office/drawing/2014/chart" uri="{C3380CC4-5D6E-409C-BE32-E72D297353CC}">
-                <c16:uniqueId val="{00000001-A394-4DE1-AD32-157694A9252E}"/>
-              </c:ext>
-            </c:extLst>
-          </c:dPt>
-          <c:dPt>
             <c:idx val="22"/>
             <c:invertIfNegative val="0"/>
             <c:bubble3D val="0"/>
@@ -620,11 +604,28 @@
               </c:ext>
             </c:extLst>
           </c:dPt>
+          <c:dPt>
+            <c:idx val="23"/>
+            <c:invertIfNegative val="0"/>
+            <c:bubble3D val="0"/>
+            <c:spPr>
+              <a:solidFill>
+                <a:schemeClr val="accent2">
+                  <a:lumMod val="40000"/>
+                  <a:lumOff val="60000"/>
+                </a:schemeClr>
+              </a:solidFill>
+              <a:ln>
+                <a:noFill/>
+              </a:ln>
+              <a:effectLst/>
+            </c:spPr>
+          </c:dPt>
           <c:cat>
             <c:strRef>
-              <c:f>Sheet1!$B$2:$B$24</c:f>
+              <c:f>Sheet1!$B$2:$B$25</c:f>
               <c:strCache>
-                <c:ptCount val="23"/>
+                <c:ptCount val="24"/>
                 <c:pt idx="0">
                   <c:v>HARP Conception</c:v>
                 </c:pt>
@@ -683,12 +684,15 @@
                   <c:v>Model Period Synthesis (Drought Forecasting)</c:v>
                 </c:pt>
                 <c:pt idx="19">
-                  <c:v>Water Supply Operations Model - Python (Tentative)</c:v>
-                </c:pt>
-                <c:pt idx="21">
+                  <c:v>VAHydro Model 3.0 (HSP2) - Operational Model in Python </c:v>
+                </c:pt>
+                <c:pt idx="20">
+                  <c:v>Water Supply Planning Tools for Local Governments</c:v>
+                </c:pt>
+                <c:pt idx="22">
                   <c:v>WUDR (Consumptive Use Data Transfer, Export, and Analysis)</c:v>
                 </c:pt>
-                <c:pt idx="22">
+                <c:pt idx="23">
                   <c:v>WUDR (Quantifying Unreported Water Use for Crop Irrigation)  </c:v>
                 </c:pt>
               </c:strCache>
@@ -696,10 +700,10 @@
           </c:cat>
           <c:val>
             <c:numRef>
-              <c:f>Sheet1!$E$2:$E$24</c:f>
+              <c:f>Sheet1!$E$2:$E$25</c:f>
               <c:numCache>
                 <c:formatCode>General</c:formatCode>
-                <c:ptCount val="23"/>
+                <c:ptCount val="24"/>
                 <c:pt idx="0">
                   <c:v>90</c:v>
                 </c:pt>
@@ -758,12 +762,15 @@
                   <c:v>151</c:v>
                 </c:pt>
                 <c:pt idx="19">
-                  <c:v>77</c:v>
-                </c:pt>
-                <c:pt idx="21">
+                  <c:v>342</c:v>
+                </c:pt>
+                <c:pt idx="20">
+                  <c:v>100</c:v>
+                </c:pt>
+                <c:pt idx="22">
                   <c:v>729</c:v>
                 </c:pt>
-                <c:pt idx="22">
+                <c:pt idx="23">
                   <c:v>729</c:v>
                 </c:pt>
               </c:numCache>
@@ -825,12 +832,12 @@
                     <c:extLst>
                       <c:ext uri="{02D57815-91ED-43cb-92C2-25804820EDAC}">
                         <c15:formulaRef>
-                          <c15:sqref>Sheet1!$B$2:$B$24</c15:sqref>
+                          <c15:sqref>Sheet1!$B$2:$B$25</c15:sqref>
                         </c15:formulaRef>
                       </c:ext>
                     </c:extLst>
                     <c:strCache>
-                      <c:ptCount val="23"/>
+                      <c:ptCount val="24"/>
                       <c:pt idx="0">
                         <c:v>HARP Conception</c:v>
                       </c:pt>
@@ -889,12 +896,15 @@
                         <c:v>Model Period Synthesis (Drought Forecasting)</c:v>
                       </c:pt>
                       <c:pt idx="19">
-                        <c:v>Water Supply Operations Model - Python (Tentative)</c:v>
+                        <c:v>VAHydro Model 3.0 (HSP2) - Operational Model in Python </c:v>
                       </c:pt>
-                      <c:pt idx="21">
+                      <c:pt idx="20">
+                        <c:v>Water Supply Planning Tools for Local Governments</c:v>
+                      </c:pt>
+                      <c:pt idx="22">
                         <c:v>WUDR (Consumptive Use Data Transfer, Export, and Analysis)</c:v>
                       </c:pt>
-                      <c:pt idx="22">
+                      <c:pt idx="23">
                         <c:v>WUDR (Quantifying Unreported Water Use for Crop Irrigation)  </c:v>
                       </c:pt>
                     </c:strCache>
@@ -905,13 +915,13 @@
                     <c:extLst>
                       <c:ext uri="{02D57815-91ED-43cb-92C2-25804820EDAC}">
                         <c15:formulaRef>
-                          <c15:sqref>Sheet1!$D$2:$D$24</c15:sqref>
+                          <c15:sqref>Sheet1!$D$2:$D$25</c15:sqref>
                         </c15:formulaRef>
                       </c:ext>
                     </c:extLst>
                     <c:numCache>
                       <c:formatCode>m/d/yy;@</c:formatCode>
-                      <c:ptCount val="23"/>
+                      <c:ptCount val="24"/>
                       <c:pt idx="0">
                         <c:v>41364</c:v>
                       </c:pt>
@@ -970,12 +980,15 @@
                         <c:v>44713</c:v>
                       </c:pt>
                       <c:pt idx="19">
-                        <c:v>44795</c:v>
+                        <c:v>45060</c:v>
                       </c:pt>
-                      <c:pt idx="21">
+                      <c:pt idx="20">
+                        <c:v>45161</c:v>
+                      </c:pt>
+                      <c:pt idx="22">
                         <c:v>43677</c:v>
                       </c:pt>
-                      <c:pt idx="22">
+                      <c:pt idx="23">
                         <c:v>44804</c:v>
                       </c:pt>
                     </c:numCache>
@@ -1043,7 +1056,6 @@
         <c:axId val="726352832"/>
         <c:scaling>
           <c:orientation val="minMax"/>
-          <c:max val="44920"/>
           <c:min val="41270"/>
         </c:scaling>
         <c:delete val="0"/>
@@ -1830,7 +1842,7 @@
           <a:p>
             <a:fld id="{D221FEF7-B48D-4556-A333-258536A9D94A}" type="datetimeFigureOut">
               <a:rPr lang="en-US" smtClean="0"/>
-              <a:t>6/3/2022</a:t>
+              <a:t>5/15/2023</a:t>
             </a:fld>
             <a:endParaRPr lang="en-US"/>
           </a:p>
@@ -2000,7 +2012,7 @@
           <a:p>
             <a:fld id="{D221FEF7-B48D-4556-A333-258536A9D94A}" type="datetimeFigureOut">
               <a:rPr lang="en-US" smtClean="0"/>
-              <a:t>6/3/2022</a:t>
+              <a:t>5/15/2023</a:t>
             </a:fld>
             <a:endParaRPr lang="en-US"/>
           </a:p>
@@ -2180,7 +2192,7 @@
           <a:p>
             <a:fld id="{D221FEF7-B48D-4556-A333-258536A9D94A}" type="datetimeFigureOut">
               <a:rPr lang="en-US" smtClean="0"/>
-              <a:t>6/3/2022</a:t>
+              <a:t>5/15/2023</a:t>
             </a:fld>
             <a:endParaRPr lang="en-US"/>
           </a:p>
@@ -2350,7 +2362,7 @@
           <a:p>
             <a:fld id="{D221FEF7-B48D-4556-A333-258536A9D94A}" type="datetimeFigureOut">
               <a:rPr lang="en-US" smtClean="0"/>
-              <a:t>6/3/2022</a:t>
+              <a:t>5/15/2023</a:t>
             </a:fld>
             <a:endParaRPr lang="en-US"/>
           </a:p>
@@ -2594,7 +2606,7 @@
           <a:p>
             <a:fld id="{D221FEF7-B48D-4556-A333-258536A9D94A}" type="datetimeFigureOut">
               <a:rPr lang="en-US" smtClean="0"/>
-              <a:t>6/3/2022</a:t>
+              <a:t>5/15/2023</a:t>
             </a:fld>
             <a:endParaRPr lang="en-US"/>
           </a:p>
@@ -2826,7 +2838,7 @@
           <a:p>
             <a:fld id="{D221FEF7-B48D-4556-A333-258536A9D94A}" type="datetimeFigureOut">
               <a:rPr lang="en-US" smtClean="0"/>
-              <a:t>6/3/2022</a:t>
+              <a:t>5/15/2023</a:t>
             </a:fld>
             <a:endParaRPr lang="en-US"/>
           </a:p>
@@ -3193,7 +3205,7 @@
           <a:p>
             <a:fld id="{D221FEF7-B48D-4556-A333-258536A9D94A}" type="datetimeFigureOut">
               <a:rPr lang="en-US" smtClean="0"/>
-              <a:t>6/3/2022</a:t>
+              <a:t>5/15/2023</a:t>
             </a:fld>
             <a:endParaRPr lang="en-US"/>
           </a:p>
@@ -3311,7 +3323,7 @@
           <a:p>
             <a:fld id="{D221FEF7-B48D-4556-A333-258536A9D94A}" type="datetimeFigureOut">
               <a:rPr lang="en-US" smtClean="0"/>
-              <a:t>6/3/2022</a:t>
+              <a:t>5/15/2023</a:t>
             </a:fld>
             <a:endParaRPr lang="en-US"/>
           </a:p>
@@ -3406,7 +3418,7 @@
           <a:p>
             <a:fld id="{D221FEF7-B48D-4556-A333-258536A9D94A}" type="datetimeFigureOut">
               <a:rPr lang="en-US" smtClean="0"/>
-              <a:t>6/3/2022</a:t>
+              <a:t>5/15/2023</a:t>
             </a:fld>
             <a:endParaRPr lang="en-US"/>
           </a:p>
@@ -3683,7 +3695,7 @@
           <a:p>
             <a:fld id="{D221FEF7-B48D-4556-A333-258536A9D94A}" type="datetimeFigureOut">
               <a:rPr lang="en-US" smtClean="0"/>
-              <a:t>6/3/2022</a:t>
+              <a:t>5/15/2023</a:t>
             </a:fld>
             <a:endParaRPr lang="en-US"/>
           </a:p>
@@ -3940,7 +3952,7 @@
           <a:p>
             <a:fld id="{D221FEF7-B48D-4556-A333-258536A9D94A}" type="datetimeFigureOut">
               <a:rPr lang="en-US" smtClean="0"/>
-              <a:t>6/3/2022</a:t>
+              <a:t>5/15/2023</a:t>
             </a:fld>
             <a:endParaRPr lang="en-US"/>
           </a:p>
@@ -4153,7 +4165,7 @@
           <a:p>
             <a:fld id="{D221FEF7-B48D-4556-A333-258536A9D94A}" type="datetimeFigureOut">
               <a:rPr lang="en-US" smtClean="0"/>
-              <a:t>6/3/2022</a:t>
+              <a:t>5/15/2023</a:t>
             </a:fld>
             <a:endParaRPr lang="en-US"/>
           </a:p>
@@ -4571,7 +4583,7 @@
           <p:nvPr>
             <p:extLst>
               <p:ext uri="{D42A27DB-BD31-4B8C-83A1-F6EECF244321}">
-                <p14:modId xmlns:p14="http://schemas.microsoft.com/office/powerpoint/2010/main" val="195987077"/>
+                <p14:modId xmlns:p14="http://schemas.microsoft.com/office/powerpoint/2010/main" val="317448969"/>
               </p:ext>
             </p:extLst>
           </p:nvPr>
@@ -4595,14 +4607,14 @@
           <p:nvPr>
             <p:extLst>
               <p:ext uri="{D42A27DB-BD31-4B8C-83A1-F6EECF244321}">
-                <p14:modId xmlns:p14="http://schemas.microsoft.com/office/powerpoint/2010/main" val="2964366408"/>
+                <p14:modId xmlns:p14="http://schemas.microsoft.com/office/powerpoint/2010/main" val="1649067287"/>
               </p:ext>
             </p:extLst>
           </p:nvPr>
         </p:nvGraphicFramePr>
         <p:xfrm>
-          <a:off x="5363310" y="13014702"/>
-          <a:ext cx="6400800" cy="370840"/>
+          <a:off x="5348377" y="12980197"/>
+          <a:ext cx="6703932" cy="370840"/>
         </p:xfrm>
         <a:graphic>
           <a:graphicData uri="http://schemas.openxmlformats.org/drawingml/2006/table">
@@ -4611,73 +4623,87 @@
                 <a:tableStyleId>{5C22544A-7EE6-4342-B048-85BDC9FD1C3A}</a:tableStyleId>
               </a:tblPr>
               <a:tblGrid>
-                <a:gridCol w="640080">
+                <a:gridCol w="558661">
                   <a:extLst>
                     <a:ext uri="{9D8B030D-6E8A-4147-A177-3AD203B41FA5}">
                       <a16:colId xmlns:a16="http://schemas.microsoft.com/office/drawing/2014/main" val="3270616706"/>
                     </a:ext>
                   </a:extLst>
                 </a:gridCol>
-                <a:gridCol w="640080">
+                <a:gridCol w="558661">
                   <a:extLst>
                     <a:ext uri="{9D8B030D-6E8A-4147-A177-3AD203B41FA5}">
                       <a16:colId xmlns:a16="http://schemas.microsoft.com/office/drawing/2014/main" val="2367470675"/>
                     </a:ext>
                   </a:extLst>
                 </a:gridCol>
-                <a:gridCol w="640080">
+                <a:gridCol w="558661">
                   <a:extLst>
                     <a:ext uri="{9D8B030D-6E8A-4147-A177-3AD203B41FA5}">
                       <a16:colId xmlns:a16="http://schemas.microsoft.com/office/drawing/2014/main" val="378166885"/>
                     </a:ext>
                   </a:extLst>
                 </a:gridCol>
-                <a:gridCol w="640080">
+                <a:gridCol w="558661">
                   <a:extLst>
                     <a:ext uri="{9D8B030D-6E8A-4147-A177-3AD203B41FA5}">
                       <a16:colId xmlns:a16="http://schemas.microsoft.com/office/drawing/2014/main" val="292921580"/>
                     </a:ext>
                   </a:extLst>
                 </a:gridCol>
-                <a:gridCol w="640080">
+                <a:gridCol w="558661">
                   <a:extLst>
                     <a:ext uri="{9D8B030D-6E8A-4147-A177-3AD203B41FA5}">
                       <a16:colId xmlns:a16="http://schemas.microsoft.com/office/drawing/2014/main" val="2012000667"/>
                     </a:ext>
                   </a:extLst>
                 </a:gridCol>
-                <a:gridCol w="640080">
+                <a:gridCol w="558661">
                   <a:extLst>
                     <a:ext uri="{9D8B030D-6E8A-4147-A177-3AD203B41FA5}">
                       <a16:colId xmlns:a16="http://schemas.microsoft.com/office/drawing/2014/main" val="28157963"/>
                     </a:ext>
                   </a:extLst>
                 </a:gridCol>
-                <a:gridCol w="640080">
+                <a:gridCol w="558661">
                   <a:extLst>
                     <a:ext uri="{9D8B030D-6E8A-4147-A177-3AD203B41FA5}">
                       <a16:colId xmlns:a16="http://schemas.microsoft.com/office/drawing/2014/main" val="3822475548"/>
                     </a:ext>
                   </a:extLst>
                 </a:gridCol>
-                <a:gridCol w="640080">
+                <a:gridCol w="558661">
                   <a:extLst>
                     <a:ext uri="{9D8B030D-6E8A-4147-A177-3AD203B41FA5}">
                       <a16:colId xmlns:a16="http://schemas.microsoft.com/office/drawing/2014/main" val="3260906801"/>
                     </a:ext>
                   </a:extLst>
                 </a:gridCol>
-                <a:gridCol w="640080">
+                <a:gridCol w="558661">
                   <a:extLst>
                     <a:ext uri="{9D8B030D-6E8A-4147-A177-3AD203B41FA5}">
                       <a16:colId xmlns:a16="http://schemas.microsoft.com/office/drawing/2014/main" val="4170611317"/>
                     </a:ext>
                   </a:extLst>
                 </a:gridCol>
-                <a:gridCol w="640080">
+                <a:gridCol w="558661">
                   <a:extLst>
                     <a:ext uri="{9D8B030D-6E8A-4147-A177-3AD203B41FA5}">
                       <a16:colId xmlns:a16="http://schemas.microsoft.com/office/drawing/2014/main" val="2755681698"/>
+                    </a:ext>
+                  </a:extLst>
+                </a:gridCol>
+                <a:gridCol w="558661">
+                  <a:extLst>
+                    <a:ext uri="{9D8B030D-6E8A-4147-A177-3AD203B41FA5}">
+                      <a16:colId xmlns:a16="http://schemas.microsoft.com/office/drawing/2014/main" val="1841187129"/>
+                    </a:ext>
+                  </a:extLst>
+                </a:gridCol>
+                <a:gridCol w="558661">
+                  <a:extLst>
+                    <a:ext uri="{9D8B030D-6E8A-4147-A177-3AD203B41FA5}">
+                      <a16:colId xmlns:a16="http://schemas.microsoft.com/office/drawing/2014/main" val="3773936116"/>
                     </a:ext>
                   </a:extLst>
                 </a:gridCol>
@@ -4689,7 +4715,7 @@
                     <a:lstStyle/>
                     <a:p>
                       <a:r>
-                        <a:rPr lang="en-US" sz="1600" b="0" dirty="0">
+                        <a:rPr lang="en-US" sz="1500" b="0" spc="-150" dirty="0">
                           <a:solidFill>
                             <a:schemeClr val="tx1"/>
                           </a:solidFill>
@@ -4710,7 +4736,7 @@
                     <a:lstStyle/>
                     <a:p>
                       <a:r>
-                        <a:rPr lang="en-US" sz="1600" b="0" dirty="0">
+                        <a:rPr lang="en-US" sz="1500" b="0" spc="-150" dirty="0">
                           <a:solidFill>
                             <a:schemeClr val="tx1"/>
                           </a:solidFill>
@@ -4731,7 +4757,7 @@
                     <a:lstStyle/>
                     <a:p>
                       <a:r>
-                        <a:rPr lang="en-US" sz="1600" b="0" dirty="0">
+                        <a:rPr lang="en-US" sz="1500" b="0" spc="-150" dirty="0">
                           <a:solidFill>
                             <a:schemeClr val="tx1"/>
                           </a:solidFill>
@@ -4752,7 +4778,7 @@
                     <a:lstStyle/>
                     <a:p>
                       <a:r>
-                        <a:rPr lang="en-US" sz="1600" b="0" dirty="0">
+                        <a:rPr lang="en-US" sz="1500" b="0" spc="-150" dirty="0">
                           <a:solidFill>
                             <a:schemeClr val="tx1"/>
                           </a:solidFill>
@@ -4773,7 +4799,7 @@
                     <a:lstStyle/>
                     <a:p>
                       <a:r>
-                        <a:rPr lang="en-US" sz="1600" b="0" dirty="0">
+                        <a:rPr lang="en-US" sz="1500" b="0" spc="-150" dirty="0">
                           <a:solidFill>
                             <a:schemeClr val="tx1"/>
                           </a:solidFill>
@@ -4794,7 +4820,7 @@
                     <a:lstStyle/>
                     <a:p>
                       <a:r>
-                        <a:rPr lang="en-US" sz="1600" b="0" dirty="0">
+                        <a:rPr lang="en-US" sz="1500" b="0" spc="-150" dirty="0">
                           <a:solidFill>
                             <a:schemeClr val="tx1"/>
                           </a:solidFill>
@@ -4815,7 +4841,7 @@
                     <a:lstStyle/>
                     <a:p>
                       <a:r>
-                        <a:rPr lang="en-US" sz="1600" b="0" dirty="0">
+                        <a:rPr lang="en-US" sz="1500" b="0" spc="-150" dirty="0">
                           <a:solidFill>
                             <a:schemeClr val="tx1"/>
                           </a:solidFill>
@@ -4836,7 +4862,7 @@
                     <a:lstStyle/>
                     <a:p>
                       <a:r>
-                        <a:rPr lang="en-US" sz="1600" b="0" dirty="0">
+                        <a:rPr lang="en-US" sz="1500" b="0" spc="-150" dirty="0">
                           <a:solidFill>
                             <a:schemeClr val="tx1"/>
                           </a:solidFill>
@@ -4857,7 +4883,7 @@
                     <a:lstStyle/>
                     <a:p>
                       <a:r>
-                        <a:rPr lang="en-US" sz="1600" b="0" dirty="0">
+                        <a:rPr lang="en-US" sz="1500" b="0" spc="-150" dirty="0">
                           <a:solidFill>
                             <a:schemeClr val="tx1"/>
                           </a:solidFill>
@@ -4878,7 +4904,7 @@
                     <a:lstStyle/>
                     <a:p>
                       <a:r>
-                        <a:rPr lang="en-US" sz="1600" b="0" dirty="0">
+                        <a:rPr lang="en-US" sz="1500" b="0" spc="-150" dirty="0">
                           <a:solidFill>
                             <a:schemeClr val="tx1"/>
                           </a:solidFill>
@@ -4886,6 +4912,48 @@
                           <a:cs typeface="Arial" panose="020B0604020202020204" pitchFamily="34" charset="0"/>
                         </a:rPr>
                         <a:t>2022</a:t>
+                      </a:r>
+                    </a:p>
+                  </a:txBody>
+                  <a:tcPr>
+                    <a:noFill/>
+                  </a:tcPr>
+                </a:tc>
+                <a:tc>
+                  <a:txBody>
+                    <a:bodyPr/>
+                    <a:lstStyle/>
+                    <a:p>
+                      <a:r>
+                        <a:rPr lang="en-US" sz="1500" b="0" spc="-150" dirty="0">
+                          <a:solidFill>
+                            <a:schemeClr val="tx1"/>
+                          </a:solidFill>
+                          <a:latin typeface="Arial" panose="020B0604020202020204" pitchFamily="34" charset="0"/>
+                          <a:cs typeface="Arial" panose="020B0604020202020204" pitchFamily="34" charset="0"/>
+                        </a:rPr>
+                        <a:t>2023</a:t>
+                      </a:r>
+                    </a:p>
+                  </a:txBody>
+                  <a:tcPr>
+                    <a:noFill/>
+                  </a:tcPr>
+                </a:tc>
+                <a:tc>
+                  <a:txBody>
+                    <a:bodyPr/>
+                    <a:lstStyle/>
+                    <a:p>
+                      <a:r>
+                        <a:rPr lang="en-US" sz="1500" b="0" spc="-150" dirty="0">
+                          <a:solidFill>
+                            <a:schemeClr val="tx1"/>
+                          </a:solidFill>
+                          <a:latin typeface="Arial" panose="020B0604020202020204" pitchFamily="34" charset="0"/>
+                          <a:cs typeface="Arial" panose="020B0604020202020204" pitchFamily="34" charset="0"/>
+                        </a:rPr>
+                        <a:t>2024</a:t>
                       </a:r>
                     </a:p>
                   </a:txBody>
@@ -4938,7 +5006,7 @@
     </p:spTree>
     <p:extLst>
       <p:ext uri="{BB962C8B-B14F-4D97-AF65-F5344CB8AC3E}">
-        <p14:creationId xmlns:p14="http://schemas.microsoft.com/office/powerpoint/2010/main" val="1537599060"/>
+        <p14:creationId xmlns:p14="http://schemas.microsoft.com/office/powerpoint/2010/main" val="3171471667"/>
       </p:ext>
     </p:extLst>
   </p:cSld>

</xml_diff>